<commit_message>
Shop completed. Created Footer. Fixed #9
</commit_message>
<xml_diff>
--- a/resources/images/shop/img.pptx
+++ b/resources/images/shop/img.pptx
@@ -6,6 +6,7 @@
   </p:sldMasterIdLst>
   <p:sldIdLst>
     <p:sldId id="256" r:id="rId2"/>
+    <p:sldId id="257" r:id="rId3"/>
   </p:sldIdLst>
   <p:sldSz cx="12192000" cy="6858000"/>
   <p:notesSz cx="6858000" cy="9144000"/>
@@ -104,6 +105,11 @@
       </a:defRPr>
     </a:lvl9pPr>
   </p:defaultTextStyle>
+  <p:extLst>
+    <p:ext uri="{EFAFB233-063F-42B5-8137-9DF3F51BA10A}">
+      <p15:sldGuideLst xmlns:p15="http://schemas.microsoft.com/office/powerpoint/2012/main"/>
+    </p:ext>
+  </p:extLst>
 </p:presentation>
 </file>
 
@@ -254,7 +260,7 @@
           <a:p>
             <a:fld id="{6D50FDA9-EC3C-40BC-95B9-55D7C98288E3}" type="datetimeFigureOut">
               <a:rPr lang="pt-PT" smtClean="0"/>
-              <a:t>14/12/2023</a:t>
+              <a:t>28/01/2024</a:t>
             </a:fld>
             <a:endParaRPr lang="pt-PT"/>
           </a:p>
@@ -452,7 +458,7 @@
           <a:p>
             <a:fld id="{6D50FDA9-EC3C-40BC-95B9-55D7C98288E3}" type="datetimeFigureOut">
               <a:rPr lang="pt-PT" smtClean="0"/>
-              <a:t>14/12/2023</a:t>
+              <a:t>28/01/2024</a:t>
             </a:fld>
             <a:endParaRPr lang="pt-PT"/>
           </a:p>
@@ -660,7 +666,7 @@
           <a:p>
             <a:fld id="{6D50FDA9-EC3C-40BC-95B9-55D7C98288E3}" type="datetimeFigureOut">
               <a:rPr lang="pt-PT" smtClean="0"/>
-              <a:t>14/12/2023</a:t>
+              <a:t>28/01/2024</a:t>
             </a:fld>
             <a:endParaRPr lang="pt-PT"/>
           </a:p>
@@ -858,7 +864,7 @@
           <a:p>
             <a:fld id="{6D50FDA9-EC3C-40BC-95B9-55D7C98288E3}" type="datetimeFigureOut">
               <a:rPr lang="pt-PT" smtClean="0"/>
-              <a:t>14/12/2023</a:t>
+              <a:t>28/01/2024</a:t>
             </a:fld>
             <a:endParaRPr lang="pt-PT"/>
           </a:p>
@@ -1133,7 +1139,7 @@
           <a:p>
             <a:fld id="{6D50FDA9-EC3C-40BC-95B9-55D7C98288E3}" type="datetimeFigureOut">
               <a:rPr lang="pt-PT" smtClean="0"/>
-              <a:t>14/12/2023</a:t>
+              <a:t>28/01/2024</a:t>
             </a:fld>
             <a:endParaRPr lang="pt-PT"/>
           </a:p>
@@ -1398,7 +1404,7 @@
           <a:p>
             <a:fld id="{6D50FDA9-EC3C-40BC-95B9-55D7C98288E3}" type="datetimeFigureOut">
               <a:rPr lang="pt-PT" smtClean="0"/>
-              <a:t>14/12/2023</a:t>
+              <a:t>28/01/2024</a:t>
             </a:fld>
             <a:endParaRPr lang="pt-PT"/>
           </a:p>
@@ -1810,7 +1816,7 @@
           <a:p>
             <a:fld id="{6D50FDA9-EC3C-40BC-95B9-55D7C98288E3}" type="datetimeFigureOut">
               <a:rPr lang="pt-PT" smtClean="0"/>
-              <a:t>14/12/2023</a:t>
+              <a:t>28/01/2024</a:t>
             </a:fld>
             <a:endParaRPr lang="pt-PT"/>
           </a:p>
@@ -1951,7 +1957,7 @@
           <a:p>
             <a:fld id="{6D50FDA9-EC3C-40BC-95B9-55D7C98288E3}" type="datetimeFigureOut">
               <a:rPr lang="pt-PT" smtClean="0"/>
-              <a:t>14/12/2023</a:t>
+              <a:t>28/01/2024</a:t>
             </a:fld>
             <a:endParaRPr lang="pt-PT"/>
           </a:p>
@@ -2064,7 +2070,7 @@
           <a:p>
             <a:fld id="{6D50FDA9-EC3C-40BC-95B9-55D7C98288E3}" type="datetimeFigureOut">
               <a:rPr lang="pt-PT" smtClean="0"/>
-              <a:t>14/12/2023</a:t>
+              <a:t>28/01/2024</a:t>
             </a:fld>
             <a:endParaRPr lang="pt-PT"/>
           </a:p>
@@ -2375,7 +2381,7 @@
           <a:p>
             <a:fld id="{6D50FDA9-EC3C-40BC-95B9-55D7C98288E3}" type="datetimeFigureOut">
               <a:rPr lang="pt-PT" smtClean="0"/>
-              <a:t>14/12/2023</a:t>
+              <a:t>28/01/2024</a:t>
             </a:fld>
             <a:endParaRPr lang="pt-PT"/>
           </a:p>
@@ -2663,7 +2669,7 @@
           <a:p>
             <a:fld id="{6D50FDA9-EC3C-40BC-95B9-55D7C98288E3}" type="datetimeFigureOut">
               <a:rPr lang="pt-PT" smtClean="0"/>
-              <a:t>14/12/2023</a:t>
+              <a:t>28/01/2024</a:t>
             </a:fld>
             <a:endParaRPr lang="pt-PT"/>
           </a:p>
@@ -2904,7 +2910,7 @@
           <a:p>
             <a:fld id="{6D50FDA9-EC3C-40BC-95B9-55D7C98288E3}" type="datetimeFigureOut">
               <a:rPr lang="pt-PT" smtClean="0"/>
-              <a:t>14/12/2023</a:t>
+              <a:t>28/01/2024</a:t>
             </a:fld>
             <a:endParaRPr lang="pt-PT"/>
           </a:p>
@@ -3321,117 +3327,305 @@
           <a:chExt cx="0" cy="0"/>
         </a:xfrm>
       </p:grpSpPr>
-      <p:sp>
-        <p:nvSpPr>
-          <p:cNvPr id="6" name="Retângulo 5">
-            <a:extLst>
-              <a:ext uri="{FF2B5EF4-FFF2-40B4-BE49-F238E27FC236}">
-                <a16:creationId xmlns:a16="http://schemas.microsoft.com/office/drawing/2014/main" id="{581EA591-8514-052A-C069-24DABDA011CD}"/>
-              </a:ext>
-            </a:extLst>
-          </p:cNvPr>
-          <p:cNvSpPr/>
+      <p:grpSp>
+        <p:nvGrpSpPr>
+          <p:cNvPr id="12" name="Agrupar 11">
+            <a:extLst>
+              <a:ext uri="{FF2B5EF4-FFF2-40B4-BE49-F238E27FC236}">
+                <a16:creationId xmlns:a16="http://schemas.microsoft.com/office/drawing/2014/main" id="{D4BCF605-8363-C540-7276-F2B403134B95}"/>
+              </a:ext>
+            </a:extLst>
+          </p:cNvPr>
+          <p:cNvGrpSpPr/>
           <p:nvPr/>
-        </p:nvSpPr>
-        <p:spPr>
+        </p:nvGrpSpPr>
+        <p:grpSpPr>
           <a:xfrm>
             <a:off x="3284035" y="1"/>
             <a:ext cx="5623930" cy="6857999"/>
+            <a:chOff x="3284035" y="1"/>
+            <a:chExt cx="5623930" cy="6857999"/>
           </a:xfrm>
-          <a:prstGeom prst="rect">
-            <a:avLst/>
-          </a:prstGeom>
-          <a:solidFill>
-            <a:schemeClr val="bg1"/>
-          </a:solidFill>
-          <a:ln>
-            <a:noFill/>
-          </a:ln>
-        </p:spPr>
-        <p:style>
-          <a:lnRef idx="2">
-            <a:schemeClr val="accent6"/>
-          </a:lnRef>
-          <a:fillRef idx="1">
-            <a:schemeClr val="lt1"/>
-          </a:fillRef>
-          <a:effectRef idx="0">
-            <a:schemeClr val="accent6"/>
-          </a:effectRef>
-          <a:fontRef idx="minor">
-            <a:schemeClr val="dk1"/>
-          </a:fontRef>
-        </p:style>
-        <p:txBody>
-          <a:bodyPr rtlCol="0" anchor="ctr"/>
-          <a:lstStyle/>
-          <a:p>
-            <a:pPr algn="ctr"/>
-            <a:endParaRPr lang="pt-PT"/>
-          </a:p>
-        </p:txBody>
-      </p:sp>
-      <p:pic>
-        <p:nvPicPr>
-          <p:cNvPr id="1032" name="Picture 8">
-            <a:extLst>
-              <a:ext uri="{FF2B5EF4-FFF2-40B4-BE49-F238E27FC236}">
-                <a16:creationId xmlns:a16="http://schemas.microsoft.com/office/drawing/2014/main" id="{71A2BB13-5C89-150F-B693-4858D9583D9B}"/>
-              </a:ext>
-            </a:extLst>
-          </p:cNvPr>
-          <p:cNvPicPr>
-            <a:picLocks noChangeAspect="1" noChangeArrowheads="1"/>
-          </p:cNvPicPr>
-          <p:nvPr/>
-        </p:nvPicPr>
-        <p:blipFill rotWithShape="1">
-          <a:blip r:embed="rId2">
-            <a:extLst>
-              <a:ext uri="{BEBA8EAE-BF5A-486C-A8C5-ECC9F3942E4B}">
-                <a14:imgProps xmlns:a14="http://schemas.microsoft.com/office/drawing/2010/main">
-                  <a14:imgLayer r:embed="rId3">
-                    <a14:imgEffect>
-                      <a14:backgroundRemoval t="28688" b="62563" l="6922" r="42834">
-                        <a14:foregroundMark x1="21661" y1="62563" x2="21661" y2="62563"/>
-                        <a14:foregroundMark x1="27606" y1="28688" x2="27606" y2="28688"/>
-                      </a14:backgroundRemoval>
-                    </a14:imgEffect>
-                  </a14:imgLayer>
-                </a14:imgProps>
-              </a:ext>
-              <a:ext uri="{28A0092B-C50C-407E-A947-70E740481C1C}">
-                <a14:useLocalDpi xmlns:a14="http://schemas.microsoft.com/office/drawing/2010/main" val="0"/>
-              </a:ext>
-            </a:extLst>
-          </a:blip>
-          <a:srcRect l="2438" t="24646" r="52541" b="33469"/>
-          <a:stretch/>
-        </p:blipFill>
-        <p:spPr bwMode="auto">
-          <a:xfrm>
-            <a:off x="4359218" y="1323977"/>
-            <a:ext cx="3473564" cy="4210046"/>
-          </a:xfrm>
-          <a:prstGeom prst="rect">
-            <a:avLst/>
-          </a:prstGeom>
-          <a:noFill/>
-          <a:extLst>
-            <a:ext uri="{909E8E84-426E-40DD-AFC4-6F175D3DCCD1}">
-              <a14:hiddenFill xmlns:a14="http://schemas.microsoft.com/office/drawing/2010/main">
-                <a:solidFill>
-                  <a:srgbClr val="FFFFFF"/>
-                </a:solidFill>
-              </a14:hiddenFill>
-            </a:ext>
-          </a:extLst>
-        </p:spPr>
-      </p:pic>
+        </p:grpSpPr>
+        <p:sp>
+          <p:nvSpPr>
+            <p:cNvPr id="6" name="Retângulo 5">
+              <a:extLst>
+                <a:ext uri="{FF2B5EF4-FFF2-40B4-BE49-F238E27FC236}">
+                  <a16:creationId xmlns:a16="http://schemas.microsoft.com/office/drawing/2014/main" id="{581EA591-8514-052A-C069-24DABDA011CD}"/>
+                </a:ext>
+              </a:extLst>
+            </p:cNvPr>
+            <p:cNvSpPr/>
+            <p:nvPr/>
+          </p:nvSpPr>
+          <p:spPr>
+            <a:xfrm>
+              <a:off x="3284035" y="1"/>
+              <a:ext cx="5623930" cy="6857999"/>
+            </a:xfrm>
+            <a:prstGeom prst="rect">
+              <a:avLst/>
+            </a:prstGeom>
+            <a:solidFill>
+              <a:schemeClr val="bg1"/>
+            </a:solidFill>
+            <a:ln>
+              <a:noFill/>
+            </a:ln>
+          </p:spPr>
+          <p:style>
+            <a:lnRef idx="2">
+              <a:schemeClr val="accent6"/>
+            </a:lnRef>
+            <a:fillRef idx="1">
+              <a:schemeClr val="lt1"/>
+            </a:fillRef>
+            <a:effectRef idx="0">
+              <a:schemeClr val="accent6"/>
+            </a:effectRef>
+            <a:fontRef idx="minor">
+              <a:schemeClr val="dk1"/>
+            </a:fontRef>
+          </p:style>
+          <p:txBody>
+            <a:bodyPr rtlCol="0" anchor="ctr"/>
+            <a:lstStyle/>
+            <a:p>
+              <a:pPr algn="ctr"/>
+              <a:endParaRPr lang="pt-PT"/>
+            </a:p>
+          </p:txBody>
+        </p:sp>
+        <p:pic>
+          <p:nvPicPr>
+            <p:cNvPr id="10" name="Imagem 9" descr="Uma imagem com pessoa, vestuário, sapatos, roupa desportiva&#10;&#10;Descrição gerada automaticamente">
+              <a:extLst>
+                <a:ext uri="{FF2B5EF4-FFF2-40B4-BE49-F238E27FC236}">
+                  <a16:creationId xmlns:a16="http://schemas.microsoft.com/office/drawing/2014/main" id="{374DBAE6-5993-4FFA-482A-E6C4CA8082D3}"/>
+                </a:ext>
+              </a:extLst>
+            </p:cNvPr>
+            <p:cNvPicPr>
+              <a:picLocks noChangeAspect="1"/>
+            </p:cNvPicPr>
+            <p:nvPr/>
+          </p:nvPicPr>
+          <p:blipFill rotWithShape="1">
+            <a:blip r:embed="rId2">
+              <a:extLst>
+                <a:ext uri="{28A0092B-C50C-407E-A947-70E740481C1C}">
+                  <a14:useLocalDpi xmlns:a14="http://schemas.microsoft.com/office/drawing/2010/main" val="0"/>
+                </a:ext>
+              </a:extLst>
+            </a:blip>
+            <a:srcRect t="44815"/>
+            <a:stretch/>
+          </p:blipFill>
+          <p:spPr>
+            <a:xfrm>
+              <a:off x="3451311" y="1604973"/>
+              <a:ext cx="5289378" cy="3648054"/>
+            </a:xfrm>
+            <a:prstGeom prst="rect">
+              <a:avLst/>
+            </a:prstGeom>
+          </p:spPr>
+        </p:pic>
+      </p:grpSp>
     </p:spTree>
     <p:extLst>
       <p:ext uri="{BB962C8B-B14F-4D97-AF65-F5344CB8AC3E}">
         <p14:creationId xmlns:p14="http://schemas.microsoft.com/office/powerpoint/2010/main" val="2231026950"/>
+      </p:ext>
+    </p:extLst>
+  </p:cSld>
+  <p:clrMapOvr>
+    <a:masterClrMapping/>
+  </p:clrMapOvr>
+</p:sld>
+</file>
+
+<file path=ppt/slides/slide2.xml><?xml version="1.0" encoding="utf-8"?>
+<p:sld xmlns:a="http://schemas.openxmlformats.org/drawingml/2006/main" xmlns:r="http://schemas.openxmlformats.org/officeDocument/2006/relationships" xmlns:p="http://schemas.openxmlformats.org/presentationml/2006/main">
+  <p:cSld>
+    <p:spTree>
+      <p:nvGrpSpPr>
+        <p:cNvPr id="1" name=""/>
+        <p:cNvGrpSpPr/>
+        <p:nvPr/>
+      </p:nvGrpSpPr>
+      <p:grpSpPr>
+        <a:xfrm>
+          <a:off x="0" y="0"/>
+          <a:ext cx="0" cy="0"/>
+          <a:chOff x="0" y="0"/>
+          <a:chExt cx="0" cy="0"/>
+        </a:xfrm>
+      </p:grpSpPr>
+      <p:grpSp>
+        <p:nvGrpSpPr>
+          <p:cNvPr id="8" name="Agrupar 7">
+            <a:extLst>
+              <a:ext uri="{FF2B5EF4-FFF2-40B4-BE49-F238E27FC236}">
+                <a16:creationId xmlns:a16="http://schemas.microsoft.com/office/drawing/2014/main" id="{B8637F4D-7442-966D-EA1E-C469F7D1A480}"/>
+              </a:ext>
+            </a:extLst>
+          </p:cNvPr>
+          <p:cNvGrpSpPr/>
+          <p:nvPr/>
+        </p:nvGrpSpPr>
+        <p:grpSpPr>
+          <a:xfrm>
+            <a:off x="3284035" y="1"/>
+            <a:ext cx="5623930" cy="6857999"/>
+            <a:chOff x="3284035" y="1"/>
+            <a:chExt cx="5623930" cy="6857999"/>
+          </a:xfrm>
+        </p:grpSpPr>
+        <p:sp>
+          <p:nvSpPr>
+            <p:cNvPr id="6" name="Retângulo 5">
+              <a:extLst>
+                <a:ext uri="{FF2B5EF4-FFF2-40B4-BE49-F238E27FC236}">
+                  <a16:creationId xmlns:a16="http://schemas.microsoft.com/office/drawing/2014/main" id="{581EA591-8514-052A-C069-24DABDA011CD}"/>
+                </a:ext>
+              </a:extLst>
+            </p:cNvPr>
+            <p:cNvSpPr/>
+            <p:nvPr/>
+          </p:nvSpPr>
+          <p:spPr>
+            <a:xfrm>
+              <a:off x="3284035" y="1"/>
+              <a:ext cx="5623930" cy="6857999"/>
+            </a:xfrm>
+            <a:prstGeom prst="rect">
+              <a:avLst/>
+            </a:prstGeom>
+            <a:solidFill>
+              <a:schemeClr val="bg1"/>
+            </a:solidFill>
+            <a:ln>
+              <a:noFill/>
+            </a:ln>
+          </p:spPr>
+          <p:style>
+            <a:lnRef idx="2">
+              <a:schemeClr val="accent6"/>
+            </a:lnRef>
+            <a:fillRef idx="1">
+              <a:schemeClr val="lt1"/>
+            </a:fillRef>
+            <a:effectRef idx="0">
+              <a:schemeClr val="accent6"/>
+            </a:effectRef>
+            <a:fontRef idx="minor">
+              <a:schemeClr val="dk1"/>
+            </a:fontRef>
+          </p:style>
+          <p:txBody>
+            <a:bodyPr rtlCol="0" anchor="ctr"/>
+            <a:lstStyle/>
+            <a:p>
+              <a:pPr algn="ctr"/>
+              <a:endParaRPr lang="pt-PT"/>
+            </a:p>
+          </p:txBody>
+        </p:sp>
+        <p:pic>
+          <p:nvPicPr>
+            <p:cNvPr id="7" name="Imagem 6" descr="Uma imagem com relva, ar livre, planta, Equipamento desportivo&#10;&#10;Descrição gerada automaticamente">
+              <a:extLst>
+                <a:ext uri="{FF2B5EF4-FFF2-40B4-BE49-F238E27FC236}">
+                  <a16:creationId xmlns:a16="http://schemas.microsoft.com/office/drawing/2014/main" id="{17887F76-92F2-4305-C690-3D6D806B333E}"/>
+                </a:ext>
+              </a:extLst>
+            </p:cNvPr>
+            <p:cNvPicPr>
+              <a:picLocks noChangeAspect="1"/>
+            </p:cNvPicPr>
+            <p:nvPr/>
+          </p:nvPicPr>
+          <p:blipFill rotWithShape="1">
+            <a:blip r:embed="rId2">
+              <a:extLst>
+                <a:ext uri="{BEBA8EAE-BF5A-486C-A8C5-ECC9F3942E4B}">
+                  <a14:imgProps xmlns:a14="http://schemas.microsoft.com/office/drawing/2010/main">
+                    <a14:imgLayer r:embed="rId3">
+                      <a14:imgEffect>
+                        <a14:backgroundRemoval t="9956" b="89956" l="1333" r="97778">
+                          <a14:foregroundMark x1="71333" y1="41867" x2="97444" y2="48444"/>
+                          <a14:foregroundMark x1="97444" y1="48444" x2="97778" y2="48533"/>
+                          <a14:foregroundMark x1="10444" y1="60000" x2="50111" y2="54044"/>
+                          <a14:foregroundMark x1="44556" y1="52000" x2="46667" y2="50222"/>
+                          <a14:foregroundMark x1="8778" y1="56978" x2="9333" y2="55111"/>
+                          <a14:foregroundMark x1="48778" y1="51200" x2="49889" y2="52089"/>
+                          <a14:foregroundMark x1="60333" y1="46844" x2="54889" y2="47111"/>
+                          <a14:foregroundMark x1="52029" y1="42934" x2="50333" y2="40533"/>
+                          <a14:foregroundMark x1="53610" y1="45171" x2="52032" y2="42938"/>
+                          <a14:foregroundMark x1="54976" y1="35003" x2="55333" y2="34578"/>
+                          <a14:foregroundMark x1="50333" y1="40533" x2="51685" y2="38923"/>
+                          <a14:foregroundMark x1="58526" y1="34251" x2="64000" y2="33689"/>
+                          <a14:foregroundMark x1="55333" y1="34578" x2="55696" y2="34541"/>
+                          <a14:foregroundMark x1="66751" y1="40037" x2="66889" y2="40356"/>
+                          <a14:foregroundMark x1="64000" y1="33689" x2="67725" y2="42284"/>
+                          <a14:foregroundMark x1="66889" y1="40356" x2="61667" y2="46311"/>
+                          <a14:foregroundMark x1="61667" y1="46311" x2="59667" y2="46489"/>
+                          <a14:foregroundMark x1="12301" y1="74089" x2="12111" y2="74489"/>
+                          <a14:foregroundMark x1="13957" y1="70601" x2="13733" y2="71073"/>
+                          <a14:foregroundMark x1="15444" y1="67467" x2="14419" y2="69628"/>
+                          <a14:foregroundMark x1="8371" y1="74851" x2="2000" y2="75467"/>
+                          <a14:foregroundMark x1="12111" y1="74489" x2="11501" y2="74548"/>
+                          <a14:foregroundMark x1="3667" y1="61867" x2="1333" y2="62489"/>
+                          <a14:foregroundMark x1="50778" y1="39022" x2="54222" y2="34311"/>
+                          <a14:foregroundMark x1="51667" y1="36711" x2="54333" y2="34311"/>
+                          <a14:foregroundMark x1="51333" y1="36711" x2="53889" y2="34578"/>
+                          <a14:foregroundMark x1="5889" y1="76622" x2="15000" y2="72444"/>
+                          <a14:foregroundMark x1="15000" y1="72444" x2="15444" y2="71733"/>
+                          <a14:backgroundMark x1="61556" y1="34667" x2="64444" y2="40711"/>
+                          <a14:backgroundMark x1="63222" y1="43822" x2="65444" y2="42044"/>
+                          <a14:backgroundMark x1="53889" y1="43822" x2="52889" y2="40000"/>
+                          <a14:backgroundMark x1="52667" y1="41511" x2="54889" y2="36356"/>
+                          <a14:backgroundMark x1="52667" y1="37244" x2="58111" y2="34933"/>
+                          <a14:backgroundMark x1="10444" y1="72889" x2="13889" y2="66844"/>
+                          <a14:backgroundMark x1="13667" y1="71022" x2="7778" y2="74400"/>
+                          <a14:backgroundMark x1="95889" y1="60978" x2="99889" y2="60711"/>
+                          <a14:backgroundMark x1="50222" y1="60356" x2="51000" y2="58756"/>
+                          <a14:backgroundMark x1="49444" y1="60978" x2="51000" y2="59289"/>
+                          <a14:backgroundMark x1="54667" y1="44711" x2="52222" y2="40533"/>
+                          <a14:backgroundMark x1="54111" y1="44178" x2="52778" y2="42667"/>
+                          <a14:backgroundMark x1="53556" y1="44000" x2="52333" y2="42578"/>
+                          <a14:backgroundMark x1="5333" y1="59022" x2="8778" y2="53956"/>
+                          <a14:backgroundMark x1="14000" y1="69511" x2="13556" y2="70489"/>
+                        </a14:backgroundRemoval>
+                      </a14:imgEffect>
+                    </a14:imgLayer>
+                  </a14:imgProps>
+                </a:ext>
+                <a:ext uri="{28A0092B-C50C-407E-A947-70E740481C1C}">
+                  <a14:useLocalDpi xmlns:a14="http://schemas.microsoft.com/office/drawing/2010/main" val="0"/>
+                </a:ext>
+              </a:extLst>
+            </a:blip>
+            <a:srcRect t="29660" b="18096"/>
+            <a:stretch/>
+          </p:blipFill>
+          <p:spPr>
+            <a:xfrm>
+              <a:off x="3284035" y="1870786"/>
+              <a:ext cx="5623930" cy="3672771"/>
+            </a:xfrm>
+            <a:prstGeom prst="rect">
+              <a:avLst/>
+            </a:prstGeom>
+          </p:spPr>
+        </p:pic>
+      </p:grpSp>
+    </p:spTree>
+    <p:extLst>
+      <p:ext uri="{BB962C8B-B14F-4D97-AF65-F5344CB8AC3E}">
+        <p14:creationId xmlns:p14="http://schemas.microsoft.com/office/powerpoint/2010/main" val="245438305"/>
       </p:ext>
     </p:extLst>
   </p:cSld>

</xml_diff>